<commit_message>
Naniar implemented for missing data analysis
</commit_message>
<xml_diff>
--- a/slides/KvL sess 01 kvant läh andmep.pptx
+++ b/slides/KvL sess 01 kvant läh andmep.pptx
@@ -228,7 +228,7 @@
           <a:p>
             <a:fld id="{3772A212-3B65-48E7-8BC8-BAC6B80C373E}" type="datetimeFigureOut">
               <a:rPr lang="en-GB" smtClean="0"/>
-              <a:t>10/02/2021</a:t>
+              <a:t>10/02/2022</a:t>
             </a:fld>
             <a:endParaRPr lang="en-GB"/>
           </a:p>
@@ -925,6 +925,90 @@
 </p:notes>
 </file>
 
+<file path=ppt/notesSlides/notesSlide4.xml><?xml version="1.0" encoding="utf-8"?>
+<p:notes xmlns:a="http://schemas.openxmlformats.org/drawingml/2006/main" xmlns:r="http://schemas.openxmlformats.org/officeDocument/2006/relationships" xmlns:p="http://schemas.openxmlformats.org/presentationml/2006/main">
+  <p:cSld>
+    <p:spTree>
+      <p:nvGrpSpPr>
+        <p:cNvPr id="1" name=""/>
+        <p:cNvGrpSpPr/>
+        <p:nvPr/>
+      </p:nvGrpSpPr>
+      <p:grpSpPr>
+        <a:xfrm>
+          <a:off x="0" y="0"/>
+          <a:ext cx="0" cy="0"/>
+          <a:chOff x="0" y="0"/>
+          <a:chExt cx="0" cy="0"/>
+        </a:xfrm>
+      </p:grpSpPr>
+      <p:sp>
+        <p:nvSpPr>
+          <p:cNvPr id="2" name="Slide Image Placeholder 1"/>
+          <p:cNvSpPr>
+            <a:spLocks noGrp="1" noRot="1" noChangeAspect="1"/>
+          </p:cNvSpPr>
+          <p:nvPr>
+            <p:ph type="sldImg"/>
+          </p:nvPr>
+        </p:nvSpPr>
+        <p:spPr/>
+      </p:sp>
+      <p:sp>
+        <p:nvSpPr>
+          <p:cNvPr id="3" name="Notes Placeholder 2"/>
+          <p:cNvSpPr>
+            <a:spLocks noGrp="1"/>
+          </p:cNvSpPr>
+          <p:nvPr>
+            <p:ph type="body" idx="1"/>
+          </p:nvPr>
+        </p:nvSpPr>
+        <p:spPr/>
+        <p:txBody>
+          <a:bodyPr/>
+          <a:lstStyle/>
+          <a:p>
+            <a:endParaRPr lang="et-EE" dirty="0"/>
+          </a:p>
+        </p:txBody>
+      </p:sp>
+      <p:sp>
+        <p:nvSpPr>
+          <p:cNvPr id="4" name="Slide Number Placeholder 3"/>
+          <p:cNvSpPr>
+            <a:spLocks noGrp="1"/>
+          </p:cNvSpPr>
+          <p:nvPr>
+            <p:ph type="sldNum" sz="quarter" idx="5"/>
+          </p:nvPr>
+        </p:nvSpPr>
+        <p:spPr/>
+        <p:txBody>
+          <a:bodyPr/>
+          <a:lstStyle/>
+          <a:p>
+            <a:fld id="{320285E4-2A43-4BA4-A4A8-E91FE0A59B09}" type="slidenum">
+              <a:rPr lang="en-GB" smtClean="0"/>
+              <a:t>7</a:t>
+            </a:fld>
+            <a:endParaRPr lang="en-GB"/>
+          </a:p>
+        </p:txBody>
+      </p:sp>
+    </p:spTree>
+    <p:extLst>
+      <p:ext uri="{BB962C8B-B14F-4D97-AF65-F5344CB8AC3E}">
+        <p14:creationId xmlns:p14="http://schemas.microsoft.com/office/powerpoint/2010/main" val="4163082909"/>
+      </p:ext>
+    </p:extLst>
+  </p:cSld>
+  <p:clrMapOvr>
+    <a:masterClrMapping/>
+  </p:clrMapOvr>
+</p:notes>
+</file>
+
 <file path=ppt/slideLayouts/slideLayout1.xml><?xml version="1.0" encoding="utf-8"?>
 <p:sldLayout xmlns:a="http://schemas.openxmlformats.org/drawingml/2006/main" xmlns:r="http://schemas.openxmlformats.org/officeDocument/2006/relationships" xmlns:p="http://schemas.openxmlformats.org/presentationml/2006/main" type="title" preserve="1">
   <p:cSld name="Title Slide">
@@ -1056,7 +1140,7 @@
           <a:p>
             <a:fld id="{412CA32F-F53E-4273-AC2B-9DDB558800F7}" type="datetimeFigureOut">
               <a:rPr lang="en-GB" smtClean="0"/>
-              <a:t>10/02/2021</a:t>
+              <a:t>10/02/2022</a:t>
             </a:fld>
             <a:endParaRPr lang="en-GB"/>
           </a:p>
@@ -1226,7 +1310,7 @@
           <a:p>
             <a:fld id="{412CA32F-F53E-4273-AC2B-9DDB558800F7}" type="datetimeFigureOut">
               <a:rPr lang="en-GB" smtClean="0"/>
-              <a:t>10/02/2021</a:t>
+              <a:t>10/02/2022</a:t>
             </a:fld>
             <a:endParaRPr lang="en-GB"/>
           </a:p>
@@ -1406,7 +1490,7 @@
           <a:p>
             <a:fld id="{412CA32F-F53E-4273-AC2B-9DDB558800F7}" type="datetimeFigureOut">
               <a:rPr lang="en-GB" smtClean="0"/>
-              <a:t>10/02/2021</a:t>
+              <a:t>10/02/2022</a:t>
             </a:fld>
             <a:endParaRPr lang="en-GB"/>
           </a:p>
@@ -1642,7 +1726,7 @@
           <a:p>
             <a:fld id="{412CA32F-F53E-4273-AC2B-9DDB558800F7}" type="datetimeFigureOut">
               <a:rPr lang="en-GB" smtClean="0"/>
-              <a:t>10/02/2021</a:t>
+              <a:t>10/02/2022</a:t>
             </a:fld>
             <a:endParaRPr lang="en-GB"/>
           </a:p>
@@ -1895,7 +1979,7 @@
           <a:p>
             <a:fld id="{412CA32F-F53E-4273-AC2B-9DDB558800F7}" type="datetimeFigureOut">
               <a:rPr lang="en-GB" smtClean="0"/>
-              <a:t>10/02/2021</a:t>
+              <a:t>10/02/2022</a:t>
             </a:fld>
             <a:endParaRPr lang="en-GB"/>
           </a:p>
@@ -2127,7 +2211,7 @@
           <a:p>
             <a:fld id="{412CA32F-F53E-4273-AC2B-9DDB558800F7}" type="datetimeFigureOut">
               <a:rPr lang="en-GB" smtClean="0"/>
-              <a:t>10/02/2021</a:t>
+              <a:t>10/02/2022</a:t>
             </a:fld>
             <a:endParaRPr lang="en-GB"/>
           </a:p>
@@ -2494,7 +2578,7 @@
           <a:p>
             <a:fld id="{412CA32F-F53E-4273-AC2B-9DDB558800F7}" type="datetimeFigureOut">
               <a:rPr lang="en-GB" smtClean="0"/>
-              <a:t>10/02/2021</a:t>
+              <a:t>10/02/2022</a:t>
             </a:fld>
             <a:endParaRPr lang="en-GB"/>
           </a:p>
@@ -2612,7 +2696,7 @@
           <a:p>
             <a:fld id="{412CA32F-F53E-4273-AC2B-9DDB558800F7}" type="datetimeFigureOut">
               <a:rPr lang="en-GB" smtClean="0"/>
-              <a:t>10/02/2021</a:t>
+              <a:t>10/02/2022</a:t>
             </a:fld>
             <a:endParaRPr lang="en-GB"/>
           </a:p>
@@ -2707,7 +2791,7 @@
           <a:p>
             <a:fld id="{412CA32F-F53E-4273-AC2B-9DDB558800F7}" type="datetimeFigureOut">
               <a:rPr lang="en-GB" smtClean="0"/>
-              <a:t>10/02/2021</a:t>
+              <a:t>10/02/2022</a:t>
             </a:fld>
             <a:endParaRPr lang="en-GB"/>
           </a:p>
@@ -2984,7 +3068,7 @@
           <a:p>
             <a:fld id="{412CA32F-F53E-4273-AC2B-9DDB558800F7}" type="datetimeFigureOut">
               <a:rPr lang="en-GB" smtClean="0"/>
-              <a:t>10/02/2021</a:t>
+              <a:t>10/02/2022</a:t>
             </a:fld>
             <a:endParaRPr lang="en-GB"/>
           </a:p>
@@ -3237,7 +3321,7 @@
           <a:p>
             <a:fld id="{412CA32F-F53E-4273-AC2B-9DDB558800F7}" type="datetimeFigureOut">
               <a:rPr lang="en-GB" smtClean="0"/>
-              <a:t>10/02/2021</a:t>
+              <a:t>10/02/2022</a:t>
             </a:fld>
             <a:endParaRPr lang="en-GB"/>
           </a:p>
@@ -3450,7 +3534,7 @@
           <a:p>
             <a:fld id="{412CA32F-F53E-4273-AC2B-9DDB558800F7}" type="datetimeFigureOut">
               <a:rPr lang="en-GB" smtClean="0"/>
-              <a:t>10/02/2021</a:t>
+              <a:t>10/02/2022</a:t>
             </a:fld>
             <a:endParaRPr lang="en-GB"/>
           </a:p>
@@ -9862,8 +9946,8 @@
           <p:nvPr/>
         </p:nvSpPr>
         <p:spPr>
-          <a:xfrm rot="10800000">
-            <a:off x="4238271" y="3675811"/>
+          <a:xfrm rot="10312805">
+            <a:off x="4238271" y="3705628"/>
             <a:ext cx="417443" cy="188844"/>
           </a:xfrm>
           <a:prstGeom prst="rightArrow">
@@ -10239,9 +10323,9 @@
                                           </p:stCondLst>
                                         </p:cTn>
                                         <p:tgtEl>
-                                          <p:spTgt spid="3">
+                                          <p:spTgt spid="4">
                                             <p:txEl>
-                                              <p:pRg st="5" end="5"/>
+                                              <p:pRg st="0" end="0"/>
                                             </p:txEl>
                                           </p:spTgt>
                                         </p:tgtEl>
@@ -10257,11 +10341,46 @@
                                       <p:cBhvr>
                                         <p:cTn id="27" dur="500"/>
                                         <p:tgtEl>
-                                          <p:spTgt spid="3">
+                                          <p:spTgt spid="4">
                                             <p:txEl>
-                                              <p:pRg st="5" end="5"/>
+                                              <p:pRg st="0" end="0"/>
                                             </p:txEl>
                                           </p:spTgt>
+                                        </p:tgtEl>
+                                      </p:cBhvr>
+                                    </p:animEffect>
+                                  </p:childTnLst>
+                                </p:cTn>
+                              </p:par>
+                              <p:par>
+                                <p:cTn id="28" presetID="10" presetClass="entr" presetSubtype="0" fill="hold" grpId="0" nodeType="withEffect">
+                                  <p:stCondLst>
+                                    <p:cond delay="0"/>
+                                  </p:stCondLst>
+                                  <p:childTnLst>
+                                    <p:set>
+                                      <p:cBhvr>
+                                        <p:cTn id="29" dur="1" fill="hold">
+                                          <p:stCondLst>
+                                            <p:cond delay="0"/>
+                                          </p:stCondLst>
+                                        </p:cTn>
+                                        <p:tgtEl>
+                                          <p:spTgt spid="5"/>
+                                        </p:tgtEl>
+                                        <p:attrNameLst>
+                                          <p:attrName>style.visibility</p:attrName>
+                                        </p:attrNameLst>
+                                      </p:cBhvr>
+                                      <p:to>
+                                        <p:strVal val="visible"/>
+                                      </p:to>
+                                    </p:set>
+                                    <p:animEffect transition="in" filter="fade">
+                                      <p:cBhvr>
+                                        <p:cTn id="30" dur="500"/>
+                                        <p:tgtEl>
+                                          <p:spTgt spid="5"/>
                                         </p:tgtEl>
                                       </p:cBhvr>
                                     </p:animEffect>
@@ -10275,26 +10394,26 @@
                     </p:cTn>
                   </p:par>
                   <p:par>
-                    <p:cTn id="28" fill="hold">
+                    <p:cTn id="31" fill="hold">
                       <p:stCondLst>
                         <p:cond delay="indefinite"/>
                       </p:stCondLst>
                       <p:childTnLst>
                         <p:par>
-                          <p:cTn id="29" fill="hold">
+                          <p:cTn id="32" fill="hold">
                             <p:stCondLst>
                               <p:cond delay="0"/>
                             </p:stCondLst>
                             <p:childTnLst>
                               <p:par>
-                                <p:cTn id="30" presetID="10" presetClass="entr" presetSubtype="0" fill="hold" nodeType="clickEffect">
+                                <p:cTn id="33" presetID="10" presetClass="entr" presetSubtype="0" fill="hold" nodeType="clickEffect">
                                   <p:stCondLst>
                                     <p:cond delay="0"/>
                                   </p:stCondLst>
                                   <p:childTnLst>
                                     <p:set>
                                       <p:cBhvr>
-                                        <p:cTn id="31" dur="1" fill="hold">
+                                        <p:cTn id="34" dur="1" fill="hold">
                                           <p:stCondLst>
                                             <p:cond delay="0"/>
                                           </p:stCondLst>
@@ -10316,7 +10435,7 @@
                                     </p:set>
                                     <p:animEffect transition="in" filter="fade">
                                       <p:cBhvr>
-                                        <p:cTn id="32" dur="500"/>
+                                        <p:cTn id="35" dur="500"/>
                                         <p:tgtEl>
                                           <p:spTgt spid="3">
                                             <p:txEl>
@@ -10336,34 +10455,34 @@
                     </p:cTn>
                   </p:par>
                   <p:par>
-                    <p:cTn id="33" fill="hold">
+                    <p:cTn id="36" fill="hold">
                       <p:stCondLst>
                         <p:cond delay="indefinite"/>
                       </p:stCondLst>
                       <p:childTnLst>
                         <p:par>
-                          <p:cTn id="34" fill="hold">
+                          <p:cTn id="37" fill="hold">
                             <p:stCondLst>
                               <p:cond delay="0"/>
                             </p:stCondLst>
                             <p:childTnLst>
                               <p:par>
-                                <p:cTn id="35" presetID="10" presetClass="entr" presetSubtype="0" fill="hold" nodeType="clickEffect">
+                                <p:cTn id="38" presetID="10" presetClass="entr" presetSubtype="0" fill="hold" nodeType="clickEffect">
                                   <p:stCondLst>
                                     <p:cond delay="0"/>
                                   </p:stCondLst>
                                   <p:childTnLst>
                                     <p:set>
                                       <p:cBhvr>
-                                        <p:cTn id="36" dur="1" fill="hold">
+                                        <p:cTn id="39" dur="1" fill="hold">
                                           <p:stCondLst>
                                             <p:cond delay="0"/>
                                           </p:stCondLst>
                                         </p:cTn>
                                         <p:tgtEl>
-                                          <p:spTgt spid="3">
+                                          <p:spTgt spid="4">
                                             <p:txEl>
-                                              <p:pRg st="6" end="6"/>
+                                              <p:pRg st="1" end="1"/>
                                             </p:txEl>
                                           </p:spTgt>
                                         </p:tgtEl>
@@ -10377,13 +10496,48 @@
                                     </p:set>
                                     <p:animEffect transition="in" filter="fade">
                                       <p:cBhvr>
-                                        <p:cTn id="37" dur="500"/>
-                                        <p:tgtEl>
-                                          <p:spTgt spid="3">
+                                        <p:cTn id="40" dur="500"/>
+                                        <p:tgtEl>
+                                          <p:spTgt spid="4">
                                             <p:txEl>
-                                              <p:pRg st="6" end="6"/>
+                                              <p:pRg st="1" end="1"/>
                                             </p:txEl>
                                           </p:spTgt>
+                                        </p:tgtEl>
+                                      </p:cBhvr>
+                                    </p:animEffect>
+                                  </p:childTnLst>
+                                </p:cTn>
+                              </p:par>
+                              <p:par>
+                                <p:cTn id="41" presetID="10" presetClass="entr" presetSubtype="0" fill="hold" grpId="0" nodeType="withEffect">
+                                  <p:stCondLst>
+                                    <p:cond delay="0"/>
+                                  </p:stCondLst>
+                                  <p:childTnLst>
+                                    <p:set>
+                                      <p:cBhvr>
+                                        <p:cTn id="42" dur="1" fill="hold">
+                                          <p:stCondLst>
+                                            <p:cond delay="0"/>
+                                          </p:stCondLst>
+                                        </p:cTn>
+                                        <p:tgtEl>
+                                          <p:spTgt spid="6"/>
+                                        </p:tgtEl>
+                                        <p:attrNameLst>
+                                          <p:attrName>style.visibility</p:attrName>
+                                        </p:attrNameLst>
+                                      </p:cBhvr>
+                                      <p:to>
+                                        <p:strVal val="visible"/>
+                                      </p:to>
+                                    </p:set>
+                                    <p:animEffect transition="in" filter="fade">
+                                      <p:cBhvr>
+                                        <p:cTn id="43" dur="500"/>
+                                        <p:tgtEl>
+                                          <p:spTgt spid="6"/>
                                         </p:tgtEl>
                                       </p:cBhvr>
                                     </p:animEffect>
@@ -10397,26 +10551,26 @@
                     </p:cTn>
                   </p:par>
                   <p:par>
-                    <p:cTn id="38" fill="hold">
+                    <p:cTn id="44" fill="hold">
                       <p:stCondLst>
                         <p:cond delay="indefinite"/>
                       </p:stCondLst>
                       <p:childTnLst>
                         <p:par>
-                          <p:cTn id="39" fill="hold">
+                          <p:cTn id="45" fill="hold">
                             <p:stCondLst>
                               <p:cond delay="0"/>
                             </p:stCondLst>
                             <p:childTnLst>
                               <p:par>
-                                <p:cTn id="40" presetID="10" presetClass="entr" presetSubtype="0" fill="hold" nodeType="clickEffect">
+                                <p:cTn id="46" presetID="10" presetClass="entr" presetSubtype="0" fill="hold" nodeType="clickEffect">
                                   <p:stCondLst>
                                     <p:cond delay="0"/>
                                   </p:stCondLst>
                                   <p:childTnLst>
                                     <p:set>
                                       <p:cBhvr>
-                                        <p:cTn id="41" dur="1" fill="hold">
+                                        <p:cTn id="47" dur="1" fill="hold">
                                           <p:stCondLst>
                                             <p:cond delay="0"/>
                                           </p:stCondLst>
@@ -10424,7 +10578,7 @@
                                         <p:tgtEl>
                                           <p:spTgt spid="3">
                                             <p:txEl>
-                                              <p:pRg st="8" end="8"/>
+                                              <p:pRg st="5" end="5"/>
                                             </p:txEl>
                                           </p:spTgt>
                                         </p:tgtEl>
@@ -10438,11 +10592,11 @@
                                     </p:set>
                                     <p:animEffect transition="in" filter="fade">
                                       <p:cBhvr>
-                                        <p:cTn id="42" dur="500"/>
+                                        <p:cTn id="48" dur="500"/>
                                         <p:tgtEl>
                                           <p:spTgt spid="3">
                                             <p:txEl>
-                                              <p:pRg st="8" end="8"/>
+                                              <p:pRg st="5" end="5"/>
                                             </p:txEl>
                                           </p:spTgt>
                                         </p:tgtEl>
@@ -10458,34 +10612,34 @@
                     </p:cTn>
                   </p:par>
                   <p:par>
-                    <p:cTn id="43" fill="hold">
+                    <p:cTn id="49" fill="hold">
                       <p:stCondLst>
                         <p:cond delay="indefinite"/>
                       </p:stCondLst>
                       <p:childTnLst>
                         <p:par>
-                          <p:cTn id="44" fill="hold">
+                          <p:cTn id="50" fill="hold">
                             <p:stCondLst>
                               <p:cond delay="0"/>
                             </p:stCondLst>
                             <p:childTnLst>
                               <p:par>
-                                <p:cTn id="45" presetID="10" presetClass="entr" presetSubtype="0" fill="hold" nodeType="clickEffect">
+                                <p:cTn id="51" presetID="10" presetClass="entr" presetSubtype="0" fill="hold" nodeType="clickEffect">
                                   <p:stCondLst>
                                     <p:cond delay="0"/>
                                   </p:stCondLst>
                                   <p:childTnLst>
                                     <p:set>
                                       <p:cBhvr>
-                                        <p:cTn id="46" dur="1" fill="hold">
+                                        <p:cTn id="52" dur="1" fill="hold">
                                           <p:stCondLst>
                                             <p:cond delay="0"/>
                                           </p:stCondLst>
                                         </p:cTn>
                                         <p:tgtEl>
-                                          <p:spTgt spid="3">
+                                          <p:spTgt spid="4">
                                             <p:txEl>
-                                              <p:pRg st="9" end="9"/>
+                                              <p:pRg st="2" end="2"/>
                                             </p:txEl>
                                           </p:spTgt>
                                         </p:tgtEl>
@@ -10499,13 +10653,48 @@
                                     </p:set>
                                     <p:animEffect transition="in" filter="fade">
                                       <p:cBhvr>
-                                        <p:cTn id="47" dur="500"/>
-                                        <p:tgtEl>
-                                          <p:spTgt spid="3">
+                                        <p:cTn id="53" dur="500"/>
+                                        <p:tgtEl>
+                                          <p:spTgt spid="4">
                                             <p:txEl>
-                                              <p:pRg st="9" end="9"/>
+                                              <p:pRg st="2" end="2"/>
                                             </p:txEl>
                                           </p:spTgt>
+                                        </p:tgtEl>
+                                      </p:cBhvr>
+                                    </p:animEffect>
+                                  </p:childTnLst>
+                                </p:cTn>
+                              </p:par>
+                              <p:par>
+                                <p:cTn id="54" presetID="10" presetClass="entr" presetSubtype="0" fill="hold" grpId="0" nodeType="withEffect">
+                                  <p:stCondLst>
+                                    <p:cond delay="0"/>
+                                  </p:stCondLst>
+                                  <p:childTnLst>
+                                    <p:set>
+                                      <p:cBhvr>
+                                        <p:cTn id="55" dur="1" fill="hold">
+                                          <p:stCondLst>
+                                            <p:cond delay="0"/>
+                                          </p:stCondLst>
+                                        </p:cTn>
+                                        <p:tgtEl>
+                                          <p:spTgt spid="7"/>
+                                        </p:tgtEl>
+                                        <p:attrNameLst>
+                                          <p:attrName>style.visibility</p:attrName>
+                                        </p:attrNameLst>
+                                      </p:cBhvr>
+                                      <p:to>
+                                        <p:strVal val="visible"/>
+                                      </p:to>
+                                    </p:set>
+                                    <p:animEffect transition="in" filter="fade">
+                                      <p:cBhvr>
+                                        <p:cTn id="56" dur="500"/>
+                                        <p:tgtEl>
+                                          <p:spTgt spid="7"/>
                                         </p:tgtEl>
                                       </p:cBhvr>
                                     </p:animEffect>
@@ -10519,34 +10708,34 @@
                     </p:cTn>
                   </p:par>
                   <p:par>
-                    <p:cTn id="48" fill="hold">
+                    <p:cTn id="57" fill="hold">
                       <p:stCondLst>
                         <p:cond delay="indefinite"/>
                       </p:stCondLst>
                       <p:childTnLst>
                         <p:par>
-                          <p:cTn id="49" fill="hold">
+                          <p:cTn id="58" fill="hold">
                             <p:stCondLst>
                               <p:cond delay="0"/>
                             </p:stCondLst>
                             <p:childTnLst>
                               <p:par>
-                                <p:cTn id="50" presetID="10" presetClass="entr" presetSubtype="0" fill="hold" nodeType="clickEffect">
+                                <p:cTn id="59" presetID="10" presetClass="entr" presetSubtype="0" fill="hold" nodeType="clickEffect">
                                   <p:stCondLst>
                                     <p:cond delay="0"/>
                                   </p:stCondLst>
                                   <p:childTnLst>
                                     <p:set>
                                       <p:cBhvr>
-                                        <p:cTn id="51" dur="1" fill="hold">
+                                        <p:cTn id="60" dur="1" fill="hold">
                                           <p:stCondLst>
                                             <p:cond delay="0"/>
                                           </p:stCondLst>
                                         </p:cTn>
                                         <p:tgtEl>
-                                          <p:spTgt spid="4">
+                                          <p:spTgt spid="3">
                                             <p:txEl>
-                                              <p:pRg st="0" end="0"/>
+                                              <p:pRg st="6" end="6"/>
                                             </p:txEl>
                                           </p:spTgt>
                                         </p:tgtEl>
@@ -10560,11 +10749,11 @@
                                     </p:set>
                                     <p:animEffect transition="in" filter="fade">
                                       <p:cBhvr>
-                                        <p:cTn id="52" dur="500"/>
-                                        <p:tgtEl>
-                                          <p:spTgt spid="4">
+                                        <p:cTn id="61" dur="500"/>
+                                        <p:tgtEl>
+                                          <p:spTgt spid="3">
                                             <p:txEl>
-                                              <p:pRg st="0" end="0"/>
+                                              <p:pRg st="6" end="6"/>
                                             </p:txEl>
                                           </p:spTgt>
                                         </p:tgtEl>
@@ -10580,26 +10769,26 @@
                     </p:cTn>
                   </p:par>
                   <p:par>
-                    <p:cTn id="53" fill="hold">
+                    <p:cTn id="62" fill="hold">
                       <p:stCondLst>
                         <p:cond delay="indefinite"/>
                       </p:stCondLst>
                       <p:childTnLst>
                         <p:par>
-                          <p:cTn id="54" fill="hold">
+                          <p:cTn id="63" fill="hold">
                             <p:stCondLst>
                               <p:cond delay="0"/>
                             </p:stCondLst>
                             <p:childTnLst>
                               <p:par>
-                                <p:cTn id="55" presetID="10" presetClass="entr" presetSubtype="0" fill="hold" nodeType="clickEffect">
+                                <p:cTn id="64" presetID="10" presetClass="entr" presetSubtype="0" fill="hold" nodeType="clickEffect">
                                   <p:stCondLst>
                                     <p:cond delay="0"/>
                                   </p:stCondLst>
                                   <p:childTnLst>
                                     <p:set>
                                       <p:cBhvr>
-                                        <p:cTn id="56" dur="1" fill="hold">
+                                        <p:cTn id="65" dur="1" fill="hold">
                                           <p:stCondLst>
                                             <p:cond delay="0"/>
                                           </p:stCondLst>
@@ -10607,7 +10796,7 @@
                                         <p:tgtEl>
                                           <p:spTgt spid="4">
                                             <p:txEl>
-                                              <p:pRg st="1" end="1"/>
+                                              <p:pRg st="3" end="3"/>
                                             </p:txEl>
                                           </p:spTgt>
                                         </p:tgtEl>
@@ -10621,13 +10810,48 @@
                                     </p:set>
                                     <p:animEffect transition="in" filter="fade">
                                       <p:cBhvr>
-                                        <p:cTn id="57" dur="500"/>
+                                        <p:cTn id="66" dur="500"/>
                                         <p:tgtEl>
                                           <p:spTgt spid="4">
                                             <p:txEl>
-                                              <p:pRg st="1" end="1"/>
+                                              <p:pRg st="3" end="3"/>
                                             </p:txEl>
                                           </p:spTgt>
+                                        </p:tgtEl>
+                                      </p:cBhvr>
+                                    </p:animEffect>
+                                  </p:childTnLst>
+                                </p:cTn>
+                              </p:par>
+                              <p:par>
+                                <p:cTn id="67" presetID="10" presetClass="entr" presetSubtype="0" fill="hold" grpId="0" nodeType="withEffect">
+                                  <p:stCondLst>
+                                    <p:cond delay="0"/>
+                                  </p:stCondLst>
+                                  <p:childTnLst>
+                                    <p:set>
+                                      <p:cBhvr>
+                                        <p:cTn id="68" dur="1" fill="hold">
+                                          <p:stCondLst>
+                                            <p:cond delay="0"/>
+                                          </p:stCondLst>
+                                        </p:cTn>
+                                        <p:tgtEl>
+                                          <p:spTgt spid="8"/>
+                                        </p:tgtEl>
+                                        <p:attrNameLst>
+                                          <p:attrName>style.visibility</p:attrName>
+                                        </p:attrNameLst>
+                                      </p:cBhvr>
+                                      <p:to>
+                                        <p:strVal val="visible"/>
+                                      </p:to>
+                                    </p:set>
+                                    <p:animEffect transition="in" filter="fade">
+                                      <p:cBhvr>
+                                        <p:cTn id="69" dur="500"/>
+                                        <p:tgtEl>
+                                          <p:spTgt spid="8"/>
                                         </p:tgtEl>
                                       </p:cBhvr>
                                     </p:animEffect>
@@ -10641,34 +10865,34 @@
                     </p:cTn>
                   </p:par>
                   <p:par>
-                    <p:cTn id="58" fill="hold">
+                    <p:cTn id="70" fill="hold">
                       <p:stCondLst>
                         <p:cond delay="indefinite"/>
                       </p:stCondLst>
                       <p:childTnLst>
                         <p:par>
-                          <p:cTn id="59" fill="hold">
+                          <p:cTn id="71" fill="hold">
                             <p:stCondLst>
                               <p:cond delay="0"/>
                             </p:stCondLst>
                             <p:childTnLst>
                               <p:par>
-                                <p:cTn id="60" presetID="10" presetClass="entr" presetSubtype="0" fill="hold" nodeType="clickEffect">
+                                <p:cTn id="72" presetID="10" presetClass="entr" presetSubtype="0" fill="hold" nodeType="clickEffect">
                                   <p:stCondLst>
                                     <p:cond delay="0"/>
                                   </p:stCondLst>
                                   <p:childTnLst>
                                     <p:set>
                                       <p:cBhvr>
-                                        <p:cTn id="61" dur="1" fill="hold">
+                                        <p:cTn id="73" dur="1" fill="hold">
                                           <p:stCondLst>
                                             <p:cond delay="0"/>
                                           </p:stCondLst>
                                         </p:cTn>
                                         <p:tgtEl>
-                                          <p:spTgt spid="4">
+                                          <p:spTgt spid="3">
                                             <p:txEl>
-                                              <p:pRg st="2" end="2"/>
+                                              <p:pRg st="8" end="8"/>
                                             </p:txEl>
                                           </p:spTgt>
                                         </p:tgtEl>
@@ -10682,11 +10906,11 @@
                                     </p:set>
                                     <p:animEffect transition="in" filter="fade">
                                       <p:cBhvr>
-                                        <p:cTn id="62" dur="500"/>
-                                        <p:tgtEl>
-                                          <p:spTgt spid="4">
+                                        <p:cTn id="74" dur="500"/>
+                                        <p:tgtEl>
+                                          <p:spTgt spid="3">
                                             <p:txEl>
-                                              <p:pRg st="2" end="2"/>
+                                              <p:pRg st="8" end="8"/>
                                             </p:txEl>
                                           </p:spTgt>
                                         </p:tgtEl>
@@ -10702,34 +10926,34 @@
                     </p:cTn>
                   </p:par>
                   <p:par>
-                    <p:cTn id="63" fill="hold">
+                    <p:cTn id="75" fill="hold">
                       <p:stCondLst>
                         <p:cond delay="indefinite"/>
                       </p:stCondLst>
                       <p:childTnLst>
                         <p:par>
-                          <p:cTn id="64" fill="hold">
+                          <p:cTn id="76" fill="hold">
                             <p:stCondLst>
                               <p:cond delay="0"/>
                             </p:stCondLst>
                             <p:childTnLst>
                               <p:par>
-                                <p:cTn id="65" presetID="10" presetClass="entr" presetSubtype="0" fill="hold" nodeType="clickEffect">
+                                <p:cTn id="77" presetID="10" presetClass="entr" presetSubtype="0" fill="hold" nodeType="clickEffect">
                                   <p:stCondLst>
                                     <p:cond delay="0"/>
                                   </p:stCondLst>
                                   <p:childTnLst>
                                     <p:set>
                                       <p:cBhvr>
-                                        <p:cTn id="66" dur="1" fill="hold">
+                                        <p:cTn id="78" dur="1" fill="hold">
                                           <p:stCondLst>
                                             <p:cond delay="0"/>
                                           </p:stCondLst>
                                         </p:cTn>
                                         <p:tgtEl>
-                                          <p:spTgt spid="4">
+                                          <p:spTgt spid="3">
                                             <p:txEl>
-                                              <p:pRg st="3" end="3"/>
+                                              <p:pRg st="9" end="9"/>
                                             </p:txEl>
                                           </p:spTgt>
                                         </p:tgtEl>
@@ -10743,11 +10967,11 @@
                                     </p:set>
                                     <p:animEffect transition="in" filter="fade">
                                       <p:cBhvr>
-                                        <p:cTn id="67" dur="500"/>
-                                        <p:tgtEl>
-                                          <p:spTgt spid="4">
+                                        <p:cTn id="79" dur="500"/>
+                                        <p:tgtEl>
+                                          <p:spTgt spid="3">
                                             <p:txEl>
-                                              <p:pRg st="3" end="3"/>
+                                              <p:pRg st="9" end="9"/>
                                             </p:txEl>
                                           </p:spTgt>
                                         </p:tgtEl>
@@ -10783,6 +11007,12 @@
         </p:cTn>
       </p:par>
     </p:tnLst>
+    <p:bldLst>
+      <p:bldP spid="5" grpId="0" animBg="1"/>
+      <p:bldP spid="6" grpId="0" animBg="1"/>
+      <p:bldP spid="7" grpId="0" animBg="1"/>
+      <p:bldP spid="8" grpId="0" animBg="1"/>
+    </p:bldLst>
   </p:timing>
 </p:sld>
 </file>
@@ -12263,7 +12493,7 @@
             <a:pPr lvl="1"/>
             <a:r>
               <a:rPr lang="et-EE" dirty="0"/>
-              <a:t>See on see, millel põhinevad usaldusvahemikud, olulisuse tõenäosus</a:t>
+              <a:t>See on see, mida püütakse hinnata usaldusvahemike, olulisuse tõenäosuse abil</a:t>
             </a:r>
           </a:p>
           <a:p>
@@ -14882,7 +15112,7 @@
           <a:p>
             <a:r>
               <a:rPr lang="et-EE" sz="1800" dirty="0"/>
-              <a:t>Ka registri- või suurandmete puhul küsimus andmete täielikkusest</a:t>
+              <a:t>Ka registri- või suurandmete puhul küsimus andmete täielikkusest ja esinduslikkusest</a:t>
             </a:r>
           </a:p>
           <a:p>
@@ -15027,7 +15257,7 @@
           <p:nvPr/>
         </p:nvPicPr>
         <p:blipFill>
-          <a:blip r:embed="rId2"/>
+          <a:blip r:embed="rId3"/>
           <a:stretch>
             <a:fillRect/>
           </a:stretch>
@@ -16338,6 +16568,41 @@
                                   </p:childTnLst>
                                 </p:cTn>
                               </p:par>
+                              <p:par>
+                                <p:cTn id="24" presetID="10" presetClass="entr" presetSubtype="0" fill="hold" grpId="0" nodeType="withEffect">
+                                  <p:stCondLst>
+                                    <p:cond delay="0"/>
+                                  </p:stCondLst>
+                                  <p:childTnLst>
+                                    <p:set>
+                                      <p:cBhvr>
+                                        <p:cTn id="25" dur="1" fill="hold">
+                                          <p:stCondLst>
+                                            <p:cond delay="0"/>
+                                          </p:stCondLst>
+                                        </p:cTn>
+                                        <p:tgtEl>
+                                          <p:spTgt spid="9"/>
+                                        </p:tgtEl>
+                                        <p:attrNameLst>
+                                          <p:attrName>style.visibility</p:attrName>
+                                        </p:attrNameLst>
+                                      </p:cBhvr>
+                                      <p:to>
+                                        <p:strVal val="visible"/>
+                                      </p:to>
+                                    </p:set>
+                                    <p:animEffect transition="in" filter="fade">
+                                      <p:cBhvr>
+                                        <p:cTn id="26" dur="500"/>
+                                        <p:tgtEl>
+                                          <p:spTgt spid="9"/>
+                                        </p:tgtEl>
+                                      </p:cBhvr>
+                                    </p:animEffect>
+                                  </p:childTnLst>
+                                </p:cTn>
+                              </p:par>
                             </p:childTnLst>
                           </p:cTn>
                         </p:par>
@@ -16365,6 +16630,9 @@
         </p:cTn>
       </p:par>
     </p:tnLst>
+    <p:bldLst>
+      <p:bldP spid="9" grpId="0"/>
+    </p:bldLst>
   </p:timing>
 </p:sld>
 </file>
@@ -16527,7 +16795,7 @@
             </a:r>
             <a:r>
               <a:rPr lang="et-EE" dirty="0"/>
-              <a:t> – vaadeldav tunnus (kas esineb andmelünk või mitte)</a:t>
+              <a:t> – vaadeldav tunnus (tunnus, milles esinevate andmelünkade juhuslikkusest oleme huvitatud)</a:t>
             </a:r>
             <a:endParaRPr lang="et-EE" i="1" dirty="0"/>
           </a:p>

</xml_diff>